<commit_message>
Changed 'level' to 'tier'
</commit_message>
<xml_diff>
--- a/Opening Ceremonies.pptx
+++ b/Opening Ceremonies.pptx
@@ -307,7 +307,7 @@
           <a:p>
             <a:fld id="{383A2373-1211-4AC4-AE08-476652FD24D8}" type="datetimeFigureOut">
               <a:rPr lang="en-US" smtClean="0"/>
-              <a:t>11/14/2013</a:t>
+              <a:t>11/15/2013</a:t>
             </a:fld>
             <a:endParaRPr lang="en-US"/>
           </a:p>
@@ -477,7 +477,7 @@
           <a:p>
             <a:fld id="{383A2373-1211-4AC4-AE08-476652FD24D8}" type="datetimeFigureOut">
               <a:rPr lang="en-US" smtClean="0"/>
-              <a:t>11/14/2013</a:t>
+              <a:t>11/15/2013</a:t>
             </a:fld>
             <a:endParaRPr lang="en-US"/>
           </a:p>
@@ -652,7 +652,7 @@
           <a:p>
             <a:fld id="{383A2373-1211-4AC4-AE08-476652FD24D8}" type="datetimeFigureOut">
               <a:rPr lang="en-US" smtClean="0"/>
-              <a:t>11/14/2013</a:t>
+              <a:t>11/15/2013</a:t>
             </a:fld>
             <a:endParaRPr lang="en-US"/>
           </a:p>
@@ -854,7 +854,7 @@
           <a:p>
             <a:fld id="{383A2373-1211-4AC4-AE08-476652FD24D8}" type="datetimeFigureOut">
               <a:rPr lang="en-US" smtClean="0"/>
-              <a:t>11/14/2013</a:t>
+              <a:t>11/15/2013</a:t>
             </a:fld>
             <a:endParaRPr lang="en-US"/>
           </a:p>
@@ -1097,7 +1097,7 @@
           <a:p>
             <a:fld id="{383A2373-1211-4AC4-AE08-476652FD24D8}" type="datetimeFigureOut">
               <a:rPr lang="en-US" smtClean="0"/>
-              <a:t>11/14/2013</a:t>
+              <a:t>11/15/2013</a:t>
             </a:fld>
             <a:endParaRPr lang="en-US"/>
           </a:p>
@@ -1407,7 +1407,7 @@
           <a:p>
             <a:fld id="{383A2373-1211-4AC4-AE08-476652FD24D8}" type="datetimeFigureOut">
               <a:rPr lang="en-US" smtClean="0"/>
-              <a:t>11/14/2013</a:t>
+              <a:t>11/15/2013</a:t>
             </a:fld>
             <a:endParaRPr lang="en-US"/>
           </a:p>
@@ -1850,7 +1850,7 @@
           <a:p>
             <a:fld id="{383A2373-1211-4AC4-AE08-476652FD24D8}" type="datetimeFigureOut">
               <a:rPr lang="en-US" smtClean="0"/>
-              <a:t>11/14/2013</a:t>
+              <a:t>11/15/2013</a:t>
             </a:fld>
             <a:endParaRPr lang="en-US"/>
           </a:p>
@@ -1963,7 +1963,7 @@
           <a:p>
             <a:fld id="{383A2373-1211-4AC4-AE08-476652FD24D8}" type="datetimeFigureOut">
               <a:rPr lang="en-US" smtClean="0"/>
-              <a:t>11/14/2013</a:t>
+              <a:t>11/15/2013</a:t>
             </a:fld>
             <a:endParaRPr lang="en-US"/>
           </a:p>
@@ -2053,7 +2053,7 @@
           <a:p>
             <a:fld id="{383A2373-1211-4AC4-AE08-476652FD24D8}" type="datetimeFigureOut">
               <a:rPr lang="en-US" smtClean="0"/>
-              <a:t>11/14/2013</a:t>
+              <a:t>11/15/2013</a:t>
             </a:fld>
             <a:endParaRPr lang="en-US"/>
           </a:p>
@@ -2338,7 +2338,7 @@
           <a:p>
             <a:fld id="{383A2373-1211-4AC4-AE08-476652FD24D8}" type="datetimeFigureOut">
               <a:rPr lang="en-US" smtClean="0"/>
-              <a:t>11/14/2013</a:t>
+              <a:t>11/15/2013</a:t>
             </a:fld>
             <a:endParaRPr lang="en-US"/>
           </a:p>
@@ -2529,7 +2529,7 @@
           <a:p>
             <a:fld id="{383A2373-1211-4AC4-AE08-476652FD24D8}" type="datetimeFigureOut">
               <a:rPr lang="en-US" smtClean="0"/>
-              <a:t>11/14/2013</a:t>
+              <a:t>11/15/2013</a:t>
             </a:fld>
             <a:endParaRPr lang="en-US"/>
           </a:p>
@@ -23029,7 +23029,7 @@
           <a:p>
             <a:fld id="{383A2373-1211-4AC4-AE08-476652FD24D8}" type="datetimeFigureOut">
               <a:rPr lang="en-US" smtClean="0"/>
-              <a:t>11/14/2013</a:t>
+              <a:t>11/15/2013</a:t>
             </a:fld>
             <a:endParaRPr lang="en-US"/>
           </a:p>
@@ -23971,7 +23971,11 @@
           <a:p>
             <a:r>
               <a:rPr lang="en-US" dirty="0" smtClean="0"/>
-              <a:t>Level 3:</a:t>
+              <a:t>Tier 3</a:t>
+            </a:r>
+            <a:r>
+              <a:rPr lang="en-US" dirty="0" smtClean="0"/>
+              <a:t>:</a:t>
             </a:r>
           </a:p>
           <a:p>
@@ -23984,8 +23988,12 @@
           </a:p>
           <a:p>
             <a:r>
+              <a:rPr lang="en-US" smtClean="0"/>
+              <a:t>Tier 2</a:t>
+            </a:r>
+            <a:r>
               <a:rPr lang="en-US" dirty="0" smtClean="0"/>
-              <a:t>Level 2:</a:t>
+              <a:t>:</a:t>
             </a:r>
           </a:p>
           <a:p>

</xml_diff>

<commit_message>
Added a new section to the slides
</commit_message>
<xml_diff>
--- a/Opening Ceremonies.pptx
+++ b/Opening Ceremonies.pptx
@@ -18,7 +18,8 @@
     <p:sldId id="267" r:id="rId12"/>
     <p:sldId id="265" r:id="rId13"/>
     <p:sldId id="268" r:id="rId14"/>
-    <p:sldId id="269" r:id="rId15"/>
+    <p:sldId id="270" r:id="rId15"/>
+    <p:sldId id="269" r:id="rId16"/>
   </p:sldIdLst>
   <p:sldSz cx="9144000" cy="6858000" type="screen4x3"/>
   <p:notesSz cx="6858000" cy="9144000"/>
@@ -23971,11 +23972,7 @@
           <a:p>
             <a:r>
               <a:rPr lang="en-US" dirty="0" smtClean="0"/>
-              <a:t>Tier 3</a:t>
-            </a:r>
-            <a:r>
-              <a:rPr lang="en-US" dirty="0" smtClean="0"/>
-              <a:t>:</a:t>
+              <a:t>Tier 3:</a:t>
             </a:r>
           </a:p>
           <a:p>
@@ -23988,12 +23985,8 @@
           </a:p>
           <a:p>
             <a:r>
-              <a:rPr lang="en-US" smtClean="0"/>
-              <a:t>Tier 2</a:t>
-            </a:r>
-            <a:r>
               <a:rPr lang="en-US" dirty="0" smtClean="0"/>
-              <a:t>:</a:t>
+              <a:t>Tier 2:</a:t>
             </a:r>
           </a:p>
           <a:p>
@@ -24127,6 +24120,108 @@
 </file>
 
 <file path=ppt/slides/slide14.xml><?xml version="1.0" encoding="utf-8"?>
+<p:sld xmlns:a="http://schemas.openxmlformats.org/drawingml/2006/main" xmlns:r="http://schemas.openxmlformats.org/officeDocument/2006/relationships" xmlns:p="http://schemas.openxmlformats.org/presentationml/2006/main">
+  <p:cSld>
+    <p:spTree>
+      <p:nvGrpSpPr>
+        <p:cNvPr id="1" name=""/>
+        <p:cNvGrpSpPr/>
+        <p:nvPr/>
+      </p:nvGrpSpPr>
+      <p:grpSpPr>
+        <a:xfrm>
+          <a:off x="0" y="0"/>
+          <a:ext cx="0" cy="0"/>
+          <a:chOff x="0" y="0"/>
+          <a:chExt cx="0" cy="0"/>
+        </a:xfrm>
+      </p:grpSpPr>
+      <p:sp>
+        <p:nvSpPr>
+          <p:cNvPr id="2" name="Title 1"/>
+          <p:cNvSpPr>
+            <a:spLocks noGrp="1"/>
+          </p:cNvSpPr>
+          <p:nvPr>
+            <p:ph type="title"/>
+          </p:nvPr>
+        </p:nvSpPr>
+        <p:spPr/>
+        <p:txBody>
+          <a:bodyPr/>
+          <a:lstStyle/>
+          <a:p>
+            <a:r>
+              <a:rPr lang="en-US" dirty="0" smtClean="0"/>
+              <a:t>Couple other quick reminders…</a:t>
+            </a:r>
+            <a:endParaRPr lang="en-US" dirty="0"/>
+          </a:p>
+        </p:txBody>
+      </p:sp>
+      <p:sp>
+        <p:nvSpPr>
+          <p:cNvPr id="3" name="Content Placeholder 2"/>
+          <p:cNvSpPr>
+            <a:spLocks noGrp="1"/>
+          </p:cNvSpPr>
+          <p:nvPr>
+            <p:ph idx="1"/>
+          </p:nvPr>
+        </p:nvSpPr>
+        <p:spPr/>
+        <p:txBody>
+          <a:bodyPr/>
+          <a:lstStyle/>
+          <a:p>
+            <a:r>
+              <a:rPr lang="en-US" dirty="0" smtClean="0"/>
+              <a:t>The Santa Claus parade is tonight from 4pm – 6pm down Broadway, so be careful with traffic!</a:t>
+            </a:r>
+          </a:p>
+          <a:p>
+            <a:r>
+              <a:rPr lang="en-US" dirty="0" smtClean="0"/>
+              <a:t>You can park on downtown streets all day Sunday for free, and two hours Saturday for free (though I've never heard of somebody ticketed for staying longer)</a:t>
+            </a:r>
+          </a:p>
+          <a:p>
+            <a:pPr lvl="1"/>
+            <a:r>
+              <a:rPr lang="en-US" dirty="0" smtClean="0"/>
+              <a:t>There are also countless bus routes that pass by </a:t>
+            </a:r>
+            <a:r>
+              <a:rPr lang="en-US" smtClean="0"/>
+              <a:t>the area…</a:t>
+            </a:r>
+          </a:p>
+          <a:p>
+            <a:endParaRPr lang="en-US" dirty="0" smtClean="0"/>
+          </a:p>
+        </p:txBody>
+      </p:sp>
+    </p:spTree>
+    <p:extLst>
+      <p:ext uri="{BB962C8B-B14F-4D97-AF65-F5344CB8AC3E}">
+        <p14:creationId xmlns:p14="http://schemas.microsoft.com/office/powerpoint/2010/main" val="905731731"/>
+      </p:ext>
+    </p:extLst>
+  </p:cSld>
+  <p:clrMapOvr>
+    <a:masterClrMapping/>
+  </p:clrMapOvr>
+  <p:timing>
+    <p:tnLst>
+      <p:par>
+        <p:cTn id="1" dur="indefinite" restart="never" nodeType="tmRoot"/>
+      </p:par>
+    </p:tnLst>
+  </p:timing>
+</p:sld>
+</file>
+
+<file path=ppt/slides/slide15.xml><?xml version="1.0" encoding="utf-8"?>
 <p:sld xmlns:a="http://schemas.openxmlformats.org/drawingml/2006/main" xmlns:r="http://schemas.openxmlformats.org/officeDocument/2006/relationships" xmlns:p="http://schemas.openxmlformats.org/presentationml/2006/main">
   <p:cSld>
     <p:spTree>

</xml_diff>